<commit_message>
Update 12/21 add feature : create tab by stock #
</commit_message>
<xml_diff>
--- a/UIDesign.pptx
+++ b/UIDesign.pptx
@@ -276,7 +276,7 @@
           <a:p>
             <a:fld id="{3A6E9893-0524-46DD-BB8B-9465A4A02A44}" type="datetimeFigureOut">
               <a:rPr lang="zh-TW" altLang="en-US" smtClean="0"/>
-              <a:t>2020/10/4</a:t>
+              <a:t>2020/12/21</a:t>
             </a:fld>
             <a:endParaRPr lang="zh-TW" altLang="en-US"/>
           </a:p>
@@ -474,7 +474,7 @@
           <a:p>
             <a:fld id="{3A6E9893-0524-46DD-BB8B-9465A4A02A44}" type="datetimeFigureOut">
               <a:rPr lang="zh-TW" altLang="en-US" smtClean="0"/>
-              <a:t>2020/10/4</a:t>
+              <a:t>2020/12/21</a:t>
             </a:fld>
             <a:endParaRPr lang="zh-TW" altLang="en-US"/>
           </a:p>
@@ -682,7 +682,7 @@
           <a:p>
             <a:fld id="{3A6E9893-0524-46DD-BB8B-9465A4A02A44}" type="datetimeFigureOut">
               <a:rPr lang="zh-TW" altLang="en-US" smtClean="0"/>
-              <a:t>2020/10/4</a:t>
+              <a:t>2020/12/21</a:t>
             </a:fld>
             <a:endParaRPr lang="zh-TW" altLang="en-US"/>
           </a:p>
@@ -880,7 +880,7 @@
           <a:p>
             <a:fld id="{3A6E9893-0524-46DD-BB8B-9465A4A02A44}" type="datetimeFigureOut">
               <a:rPr lang="zh-TW" altLang="en-US" smtClean="0"/>
-              <a:t>2020/10/4</a:t>
+              <a:t>2020/12/21</a:t>
             </a:fld>
             <a:endParaRPr lang="zh-TW" altLang="en-US"/>
           </a:p>
@@ -1155,7 +1155,7 @@
           <a:p>
             <a:fld id="{3A6E9893-0524-46DD-BB8B-9465A4A02A44}" type="datetimeFigureOut">
               <a:rPr lang="zh-TW" altLang="en-US" smtClean="0"/>
-              <a:t>2020/10/4</a:t>
+              <a:t>2020/12/21</a:t>
             </a:fld>
             <a:endParaRPr lang="zh-TW" altLang="en-US"/>
           </a:p>
@@ -1420,7 +1420,7 @@
           <a:p>
             <a:fld id="{3A6E9893-0524-46DD-BB8B-9465A4A02A44}" type="datetimeFigureOut">
               <a:rPr lang="zh-TW" altLang="en-US" smtClean="0"/>
-              <a:t>2020/10/4</a:t>
+              <a:t>2020/12/21</a:t>
             </a:fld>
             <a:endParaRPr lang="zh-TW" altLang="en-US"/>
           </a:p>
@@ -1832,7 +1832,7 @@
           <a:p>
             <a:fld id="{3A6E9893-0524-46DD-BB8B-9465A4A02A44}" type="datetimeFigureOut">
               <a:rPr lang="zh-TW" altLang="en-US" smtClean="0"/>
-              <a:t>2020/10/4</a:t>
+              <a:t>2020/12/21</a:t>
             </a:fld>
             <a:endParaRPr lang="zh-TW" altLang="en-US"/>
           </a:p>
@@ -1973,7 +1973,7 @@
           <a:p>
             <a:fld id="{3A6E9893-0524-46DD-BB8B-9465A4A02A44}" type="datetimeFigureOut">
               <a:rPr lang="zh-TW" altLang="en-US" smtClean="0"/>
-              <a:t>2020/10/4</a:t>
+              <a:t>2020/12/21</a:t>
             </a:fld>
             <a:endParaRPr lang="zh-TW" altLang="en-US"/>
           </a:p>
@@ -2086,7 +2086,7 @@
           <a:p>
             <a:fld id="{3A6E9893-0524-46DD-BB8B-9465A4A02A44}" type="datetimeFigureOut">
               <a:rPr lang="zh-TW" altLang="en-US" smtClean="0"/>
-              <a:t>2020/10/4</a:t>
+              <a:t>2020/12/21</a:t>
             </a:fld>
             <a:endParaRPr lang="zh-TW" altLang="en-US"/>
           </a:p>
@@ -2397,7 +2397,7 @@
           <a:p>
             <a:fld id="{3A6E9893-0524-46DD-BB8B-9465A4A02A44}" type="datetimeFigureOut">
               <a:rPr lang="zh-TW" altLang="en-US" smtClean="0"/>
-              <a:t>2020/10/4</a:t>
+              <a:t>2020/12/21</a:t>
             </a:fld>
             <a:endParaRPr lang="zh-TW" altLang="en-US"/>
           </a:p>
@@ -2685,7 +2685,7 @@
           <a:p>
             <a:fld id="{3A6E9893-0524-46DD-BB8B-9465A4A02A44}" type="datetimeFigureOut">
               <a:rPr lang="zh-TW" altLang="en-US" smtClean="0"/>
-              <a:t>2020/10/4</a:t>
+              <a:t>2020/12/21</a:t>
             </a:fld>
             <a:endParaRPr lang="zh-TW" altLang="en-US"/>
           </a:p>
@@ -2926,7 +2926,7 @@
           <a:p>
             <a:fld id="{3A6E9893-0524-46DD-BB8B-9465A4A02A44}" type="datetimeFigureOut">
               <a:rPr lang="zh-TW" altLang="en-US" smtClean="0"/>
-              <a:t>2020/10/4</a:t>
+              <a:t>2020/12/21</a:t>
             </a:fld>
             <a:endParaRPr lang="zh-TW" altLang="en-US"/>
           </a:p>
@@ -3343,36 +3343,6 @@
           <a:chExt cx="0" cy="0"/>
         </a:xfrm>
       </p:grpSpPr>
-      <p:pic>
-        <p:nvPicPr>
-          <p:cNvPr id="12" name="圖片 11">
-            <a:extLst>
-              <a:ext uri="{FF2B5EF4-FFF2-40B4-BE49-F238E27FC236}">
-                <a16:creationId xmlns:a16="http://schemas.microsoft.com/office/drawing/2014/main" id="{5769DA0D-0B05-46E6-BD3E-0532C4639B26}"/>
-              </a:ext>
-            </a:extLst>
-          </p:cNvPr>
-          <p:cNvPicPr>
-            <a:picLocks noChangeAspect="1"/>
-          </p:cNvPicPr>
-          <p:nvPr/>
-        </p:nvPicPr>
-        <p:blipFill>
-          <a:blip r:embed="rId2"/>
-          <a:stretch>
-            <a:fillRect/>
-          </a:stretch>
-        </p:blipFill>
-        <p:spPr>
-          <a:xfrm>
-            <a:off x="1047606" y="1078057"/>
-            <a:ext cx="8582025" cy="5200650"/>
-          </a:xfrm>
-          <a:prstGeom prst="rect">
-            <a:avLst/>
-          </a:prstGeom>
-        </p:spPr>
-      </p:pic>
       <p:grpSp>
         <p:nvGrpSpPr>
           <p:cNvPr id="19" name="群組 18">
@@ -3527,7 +3497,7 @@
         </p:nvGrpSpPr>
         <p:grpSpPr>
           <a:xfrm rot="10800000">
-            <a:off x="9439050" y="5188261"/>
+            <a:off x="9226262" y="4391633"/>
             <a:ext cx="783038" cy="646331"/>
             <a:chOff x="2535895" y="729673"/>
             <a:chExt cx="783038" cy="692727"/>
@@ -3632,7 +3602,7 @@
         </p:nvSpPr>
         <p:spPr>
           <a:xfrm>
-            <a:off x="9629631" y="3786201"/>
+            <a:off x="9238112" y="3468303"/>
             <a:ext cx="2359169" cy="923330"/>
           </a:xfrm>
           <a:prstGeom prst="rect">
@@ -3669,6 +3639,145 @@
               <a:t>Width not</a:t>
             </a:r>
             <a:endParaRPr lang="zh-TW" altLang="en-US" dirty="0"/>
+          </a:p>
+        </p:txBody>
+      </p:sp>
+      <p:pic>
+        <p:nvPicPr>
+          <p:cNvPr id="3" name="圖片 2">
+            <a:extLst>
+              <a:ext uri="{FF2B5EF4-FFF2-40B4-BE49-F238E27FC236}">
+                <a16:creationId xmlns:a16="http://schemas.microsoft.com/office/drawing/2014/main" id="{949BD83F-F9F3-4EA7-BC36-9C2A459E00FD}"/>
+              </a:ext>
+            </a:extLst>
+          </p:cNvPr>
+          <p:cNvPicPr>
+            <a:picLocks noChangeAspect="1"/>
+          </p:cNvPicPr>
+          <p:nvPr/>
+        </p:nvPicPr>
+        <p:blipFill>
+          <a:blip r:embed="rId2"/>
+          <a:stretch>
+            <a:fillRect/>
+          </a:stretch>
+        </p:blipFill>
+        <p:spPr>
+          <a:xfrm>
+            <a:off x="398585" y="1634497"/>
+            <a:ext cx="8660235" cy="4200096"/>
+          </a:xfrm>
+          <a:prstGeom prst="rect">
+            <a:avLst/>
+          </a:prstGeom>
+        </p:spPr>
+      </p:pic>
+      <p:sp>
+        <p:nvSpPr>
+          <p:cNvPr id="4" name="矩形 3">
+            <a:extLst>
+              <a:ext uri="{FF2B5EF4-FFF2-40B4-BE49-F238E27FC236}">
+                <a16:creationId xmlns:a16="http://schemas.microsoft.com/office/drawing/2014/main" id="{E5AB6E28-2EF5-461D-9E63-220360D7BC05}"/>
+              </a:ext>
+            </a:extLst>
+          </p:cNvPr>
+          <p:cNvSpPr/>
+          <p:nvPr/>
+        </p:nvSpPr>
+        <p:spPr>
+          <a:xfrm>
+            <a:off x="398582" y="1905000"/>
+            <a:ext cx="5988965" cy="3929593"/>
+          </a:xfrm>
+          <a:prstGeom prst="rect">
+            <a:avLst/>
+          </a:prstGeom>
+          <a:noFill/>
+          <a:ln w="127000">
+            <a:solidFill>
+              <a:schemeClr val="accent1">
+                <a:shade val="50000"/>
+                <a:alpha val="78000"/>
+              </a:schemeClr>
+            </a:solidFill>
+          </a:ln>
+        </p:spPr>
+        <p:style>
+          <a:lnRef idx="2">
+            <a:schemeClr val="accent1">
+              <a:shade val="50000"/>
+            </a:schemeClr>
+          </a:lnRef>
+          <a:fillRef idx="1">
+            <a:schemeClr val="accent1"/>
+          </a:fillRef>
+          <a:effectRef idx="0">
+            <a:schemeClr val="accent1"/>
+          </a:effectRef>
+          <a:fontRef idx="minor">
+            <a:schemeClr val="lt1"/>
+          </a:fontRef>
+        </p:style>
+        <p:txBody>
+          <a:bodyPr rtlCol="0" anchor="ctr"/>
+          <a:lstStyle/>
+          <a:p>
+            <a:pPr algn="ctr"/>
+            <a:endParaRPr lang="zh-TW" altLang="en-US"/>
+          </a:p>
+        </p:txBody>
+      </p:sp>
+      <p:sp>
+        <p:nvSpPr>
+          <p:cNvPr id="14" name="矩形 13">
+            <a:extLst>
+              <a:ext uri="{FF2B5EF4-FFF2-40B4-BE49-F238E27FC236}">
+                <a16:creationId xmlns:a16="http://schemas.microsoft.com/office/drawing/2014/main" id="{2DD774A0-C803-44DB-83C8-E874693BC66A}"/>
+              </a:ext>
+            </a:extLst>
+          </p:cNvPr>
+          <p:cNvSpPr/>
+          <p:nvPr/>
+        </p:nvSpPr>
+        <p:spPr>
+          <a:xfrm>
+            <a:off x="6387548" y="1905000"/>
+            <a:ext cx="2671272" cy="3929593"/>
+          </a:xfrm>
+          <a:prstGeom prst="rect">
+            <a:avLst/>
+          </a:prstGeom>
+          <a:noFill/>
+          <a:ln w="127000">
+            <a:solidFill>
+              <a:srgbClr val="FF0000">
+                <a:alpha val="78000"/>
+              </a:srgbClr>
+            </a:solidFill>
+          </a:ln>
+        </p:spPr>
+        <p:style>
+          <a:lnRef idx="2">
+            <a:schemeClr val="accent1">
+              <a:shade val="50000"/>
+            </a:schemeClr>
+          </a:lnRef>
+          <a:fillRef idx="1">
+            <a:schemeClr val="accent1"/>
+          </a:fillRef>
+          <a:effectRef idx="0">
+            <a:schemeClr val="accent1"/>
+          </a:effectRef>
+          <a:fontRef idx="minor">
+            <a:schemeClr val="lt1"/>
+          </a:fontRef>
+        </p:style>
+        <p:txBody>
+          <a:bodyPr rtlCol="0" anchor="ctr"/>
+          <a:lstStyle/>
+          <a:p>
+            <a:pPr algn="ctr"/>
+            <a:endParaRPr lang="zh-TW" altLang="en-US"/>
           </a:p>
         </p:txBody>
       </p:sp>
@@ -3704,10 +3813,10 @@
       </p:grpSpPr>
       <p:pic>
         <p:nvPicPr>
-          <p:cNvPr id="2" name="圖片 1">
-            <a:extLst>
-              <a:ext uri="{FF2B5EF4-FFF2-40B4-BE49-F238E27FC236}">
-                <a16:creationId xmlns:a16="http://schemas.microsoft.com/office/drawing/2014/main" id="{5C0882E7-E407-4FC2-8A39-104E57AFF318}"/>
+          <p:cNvPr id="10" name="圖片 9">
+            <a:extLst>
+              <a:ext uri="{FF2B5EF4-FFF2-40B4-BE49-F238E27FC236}">
+                <a16:creationId xmlns:a16="http://schemas.microsoft.com/office/drawing/2014/main" id="{A5102854-3199-432E-8A63-CF7B3BD89295}"/>
               </a:ext>
             </a:extLst>
           </p:cNvPr>
@@ -3724,8 +3833,8 @@
         </p:blipFill>
         <p:spPr>
           <a:xfrm>
-            <a:off x="149408" y="279721"/>
-            <a:ext cx="5848680" cy="4475195"/>
+            <a:off x="0" y="582960"/>
+            <a:ext cx="6383672" cy="4174264"/>
           </a:xfrm>
           <a:prstGeom prst="rect">
             <a:avLst/>
@@ -3746,8 +3855,8 @@
         </p:nvSpPr>
         <p:spPr>
           <a:xfrm>
-            <a:off x="1536470" y="3286918"/>
-            <a:ext cx="4991878" cy="195943"/>
+            <a:off x="2080590" y="3286919"/>
+            <a:ext cx="4447757" cy="142082"/>
           </a:xfrm>
           <a:prstGeom prst="rightArrow">
             <a:avLst/>

</xml_diff>